<commit_message>
login listo sin responsive
</commit_message>
<xml_diff>
--- a/Diseño/website.pptx
+++ b/Diseño/website.pptx
@@ -4255,10 +4255,10 @@
       </p:sp>
       <p:sp>
         <p:nvSpPr>
-          <p:cNvPr id="13" name="Rectángulo 12">
+          <p:cNvPr id="14" name="Rectángulo 13">
             <a:extLst>
               <a:ext uri="{FF2B5EF4-FFF2-40B4-BE49-F238E27FC236}">
-                <a16:creationId xmlns:a16="http://schemas.microsoft.com/office/drawing/2014/main" id="{AAD63D8E-C1FC-4155-B4BB-5057EC439F0F}"/>
+                <a16:creationId xmlns:a16="http://schemas.microsoft.com/office/drawing/2014/main" id="{41A0416B-6382-444F-88FC-AA8DEDE0DF8D}"/>
               </a:ext>
             </a:extLst>
           </p:cNvPr>
@@ -4267,8 +4267,8 @@
         </p:nvSpPr>
         <p:spPr>
           <a:xfrm>
-            <a:off x="304801" y="1807028"/>
-            <a:ext cx="8119872" cy="508000"/>
+            <a:off x="1444170" y="2315028"/>
+            <a:ext cx="6980501" cy="508000"/>
           </a:xfrm>
           <a:prstGeom prst="rect">
             <a:avLst/>
@@ -4304,19 +4304,22 @@
           <a:p>
             <a:r>
               <a:rPr lang="es-CO" dirty="0">
+                <a:solidFill>
+                  <a:srgbClr val="085173"/>
+                </a:solidFill>
                 <a:latin typeface="Raleway" panose="020B0503030101060003" pitchFamily="34" charset="0"/>
               </a:rPr>
-              <a:t>Abiertos</a:t>
-            </a:r>
-          </a:p>
-        </p:txBody>
-      </p:sp>
-      <p:sp>
-        <p:nvSpPr>
-          <p:cNvPr id="14" name="Rectángulo 13">
+              <a:t>https://www.w3schools.com/howto/tryit.asp?filename=tryhow_css_table_responsive</a:t>
+            </a:r>
+          </a:p>
+        </p:txBody>
+      </p:sp>
+      <p:sp>
+        <p:nvSpPr>
+          <p:cNvPr id="15" name="Rectángulo 14">
             <a:extLst>
               <a:ext uri="{FF2B5EF4-FFF2-40B4-BE49-F238E27FC236}">
-                <a16:creationId xmlns:a16="http://schemas.microsoft.com/office/drawing/2014/main" id="{41A0416B-6382-444F-88FC-AA8DEDE0DF8D}"/>
+                <a16:creationId xmlns:a16="http://schemas.microsoft.com/office/drawing/2014/main" id="{B918DB4C-0C0A-4B03-8A9E-2142B48FD186}"/>
               </a:ext>
             </a:extLst>
           </p:cNvPr>
@@ -4325,8 +4328,8 @@
         </p:nvSpPr>
         <p:spPr>
           <a:xfrm>
-            <a:off x="304799" y="2315028"/>
-            <a:ext cx="8119873" cy="508000"/>
+            <a:off x="1444171" y="2823028"/>
+            <a:ext cx="6980500" cy="508000"/>
           </a:xfrm>
           <a:prstGeom prst="rect">
             <a:avLst/>
@@ -4362,22 +4365,19 @@
           <a:p>
             <a:r>
               <a:rPr lang="es-CO" dirty="0">
-                <a:solidFill>
-                  <a:srgbClr val="085173"/>
-                </a:solidFill>
                 <a:latin typeface="Raleway" panose="020B0503030101060003" pitchFamily="34" charset="0"/>
               </a:rPr>
-              <a:t>https://www.w3schools.com/howto/tryit.asp?filename=tryhow_css_table_responsive</a:t>
-            </a:r>
-          </a:p>
-        </p:txBody>
-      </p:sp>
-      <p:sp>
-        <p:nvSpPr>
-          <p:cNvPr id="15" name="Rectángulo 14">
+              <a:t>Abiertos</a:t>
+            </a:r>
+          </a:p>
+        </p:txBody>
+      </p:sp>
+      <p:sp>
+        <p:nvSpPr>
+          <p:cNvPr id="16" name="Rectángulo 15">
             <a:extLst>
               <a:ext uri="{FF2B5EF4-FFF2-40B4-BE49-F238E27FC236}">
-                <a16:creationId xmlns:a16="http://schemas.microsoft.com/office/drawing/2014/main" id="{B918DB4C-0C0A-4B03-8A9E-2142B48FD186}"/>
+                <a16:creationId xmlns:a16="http://schemas.microsoft.com/office/drawing/2014/main" id="{09BD083F-4395-44BC-B5D0-EEDCFD5C124B}"/>
               </a:ext>
             </a:extLst>
           </p:cNvPr>
@@ -4386,8 +4386,8 @@
         </p:nvSpPr>
         <p:spPr>
           <a:xfrm>
-            <a:off x="304800" y="2823028"/>
-            <a:ext cx="8119872" cy="508000"/>
+            <a:off x="1444170" y="3331028"/>
+            <a:ext cx="6980500" cy="508000"/>
           </a:xfrm>
           <a:prstGeom prst="rect">
             <a:avLst/>
@@ -4432,10 +4432,10 @@
       </p:sp>
       <p:sp>
         <p:nvSpPr>
-          <p:cNvPr id="16" name="Rectángulo 15">
+          <p:cNvPr id="22" name="Rectángulo 21">
             <a:extLst>
               <a:ext uri="{FF2B5EF4-FFF2-40B4-BE49-F238E27FC236}">
-                <a16:creationId xmlns:a16="http://schemas.microsoft.com/office/drawing/2014/main" id="{09BD083F-4395-44BC-B5D0-EEDCFD5C124B}"/>
+                <a16:creationId xmlns:a16="http://schemas.microsoft.com/office/drawing/2014/main" id="{C73141E9-875C-4236-91C8-AC0D9A3407CB}"/>
               </a:ext>
             </a:extLst>
           </p:cNvPr>
@@ -4444,8 +4444,8 @@
         </p:nvSpPr>
         <p:spPr>
           <a:xfrm>
-            <a:off x="304799" y="3331028"/>
-            <a:ext cx="8119872" cy="508000"/>
+            <a:off x="1444169" y="3839028"/>
+            <a:ext cx="6980500" cy="508000"/>
           </a:xfrm>
           <a:prstGeom prst="rect">
             <a:avLst/>
@@ -4490,10 +4490,10 @@
       </p:sp>
       <p:sp>
         <p:nvSpPr>
-          <p:cNvPr id="22" name="Rectángulo 21">
+          <p:cNvPr id="2" name="Signo menos 1">
             <a:extLst>
               <a:ext uri="{FF2B5EF4-FFF2-40B4-BE49-F238E27FC236}">
-                <a16:creationId xmlns:a16="http://schemas.microsoft.com/office/drawing/2014/main" id="{C73141E9-875C-4236-91C8-AC0D9A3407CB}"/>
+                <a16:creationId xmlns:a16="http://schemas.microsoft.com/office/drawing/2014/main" id="{75AA531D-ADD4-4683-B42A-EFF54C6F20FF}"/>
               </a:ext>
             </a:extLst>
           </p:cNvPr>
@@ -4502,8 +4502,424 @@
         </p:nvSpPr>
         <p:spPr>
           <a:xfrm>
-            <a:off x="304798" y="3839028"/>
-            <a:ext cx="8119872" cy="508000"/>
+            <a:off x="8275465" y="1454202"/>
+            <a:ext cx="309735" cy="197651"/>
+          </a:xfrm>
+          <a:prstGeom prst="mathMinus">
+            <a:avLst/>
+          </a:prstGeom>
+          <a:solidFill>
+            <a:schemeClr val="bg1"/>
+          </a:solidFill>
+          <a:ln>
+            <a:noFill/>
+          </a:ln>
+        </p:spPr>
+        <p:style>
+          <a:lnRef idx="2">
+            <a:schemeClr val="accent1">
+              <a:shade val="50000"/>
+            </a:schemeClr>
+          </a:lnRef>
+          <a:fillRef idx="1">
+            <a:schemeClr val="accent1"/>
+          </a:fillRef>
+          <a:effectRef idx="0">
+            <a:schemeClr val="accent1"/>
+          </a:effectRef>
+          <a:fontRef idx="minor">
+            <a:schemeClr val="lt1"/>
+          </a:fontRef>
+        </p:style>
+        <p:txBody>
+          <a:bodyPr rtlCol="0" anchor="ctr"/>
+          <a:lstStyle/>
+          <a:p>
+            <a:pPr algn="ctr"/>
+            <a:endParaRPr lang="es-CO"/>
+          </a:p>
+        </p:txBody>
+      </p:sp>
+      <p:pic>
+        <p:nvPicPr>
+          <p:cNvPr id="23" name="Gráfico 22" descr="Contrato">
+            <a:extLst>
+              <a:ext uri="{FF2B5EF4-FFF2-40B4-BE49-F238E27FC236}">
+                <a16:creationId xmlns:a16="http://schemas.microsoft.com/office/drawing/2014/main" id="{C3690510-13DE-404D-B136-635019266933}"/>
+              </a:ext>
+            </a:extLst>
+          </p:cNvPr>
+          <p:cNvPicPr>
+            <a:picLocks noChangeAspect="1"/>
+          </p:cNvPicPr>
+          <p:nvPr/>
+        </p:nvPicPr>
+        <p:blipFill>
+          <a:blip r:embed="rId6">
+            <a:extLst>
+              <a:ext uri="{28A0092B-C50C-407E-A947-70E740481C1C}">
+                <a14:useLocalDpi xmlns:a14="http://schemas.microsoft.com/office/drawing/2010/main" val="0"/>
+              </a:ext>
+              <a:ext uri="{96DAC541-7B7A-43D3-8B79-37D633B846F1}">
+                <asvg:svgBlip xmlns:asvg="http://schemas.microsoft.com/office/drawing/2016/SVG/main" r:embed="rId7"/>
+              </a:ext>
+            </a:extLst>
+          </a:blip>
+          <a:stretch>
+            <a:fillRect/>
+          </a:stretch>
+        </p:blipFill>
+        <p:spPr>
+          <a:xfrm>
+            <a:off x="8477809" y="2394856"/>
+            <a:ext cx="335537" cy="335537"/>
+          </a:xfrm>
+          <a:prstGeom prst="rect">
+            <a:avLst/>
+          </a:prstGeom>
+        </p:spPr>
+      </p:pic>
+      <p:pic>
+        <p:nvPicPr>
+          <p:cNvPr id="24" name="Gráfico 23" descr="Contrato">
+            <a:extLst>
+              <a:ext uri="{FF2B5EF4-FFF2-40B4-BE49-F238E27FC236}">
+                <a16:creationId xmlns:a16="http://schemas.microsoft.com/office/drawing/2014/main" id="{3A538ADD-E2D0-419E-B523-56AF75910829}"/>
+              </a:ext>
+            </a:extLst>
+          </p:cNvPr>
+          <p:cNvPicPr>
+            <a:picLocks noChangeAspect="1"/>
+          </p:cNvPicPr>
+          <p:nvPr/>
+        </p:nvPicPr>
+        <p:blipFill>
+          <a:blip r:embed="rId6">
+            <a:extLst>
+              <a:ext uri="{28A0092B-C50C-407E-A947-70E740481C1C}">
+                <a14:useLocalDpi xmlns:a14="http://schemas.microsoft.com/office/drawing/2010/main" val="0"/>
+              </a:ext>
+              <a:ext uri="{96DAC541-7B7A-43D3-8B79-37D633B846F1}">
+                <asvg:svgBlip xmlns:asvg="http://schemas.microsoft.com/office/drawing/2016/SVG/main" r:embed="rId7"/>
+              </a:ext>
+            </a:extLst>
+          </a:blip>
+          <a:stretch>
+            <a:fillRect/>
+          </a:stretch>
+        </p:blipFill>
+        <p:spPr>
+          <a:xfrm>
+            <a:off x="8477808" y="2909259"/>
+            <a:ext cx="335537" cy="335537"/>
+          </a:xfrm>
+          <a:prstGeom prst="rect">
+            <a:avLst/>
+          </a:prstGeom>
+        </p:spPr>
+      </p:pic>
+      <p:pic>
+        <p:nvPicPr>
+          <p:cNvPr id="25" name="Gráfico 24" descr="Contrato">
+            <a:extLst>
+              <a:ext uri="{FF2B5EF4-FFF2-40B4-BE49-F238E27FC236}">
+                <a16:creationId xmlns:a16="http://schemas.microsoft.com/office/drawing/2014/main" id="{4F77D987-094F-433E-8A76-93CB2C8C0107}"/>
+              </a:ext>
+            </a:extLst>
+          </p:cNvPr>
+          <p:cNvPicPr>
+            <a:picLocks noChangeAspect="1"/>
+          </p:cNvPicPr>
+          <p:nvPr/>
+        </p:nvPicPr>
+        <p:blipFill>
+          <a:blip r:embed="rId6">
+            <a:extLst>
+              <a:ext uri="{28A0092B-C50C-407E-A947-70E740481C1C}">
+                <a14:useLocalDpi xmlns:a14="http://schemas.microsoft.com/office/drawing/2010/main" val="0"/>
+              </a:ext>
+              <a:ext uri="{96DAC541-7B7A-43D3-8B79-37D633B846F1}">
+                <asvg:svgBlip xmlns:asvg="http://schemas.microsoft.com/office/drawing/2016/SVG/main" r:embed="rId7"/>
+              </a:ext>
+            </a:extLst>
+          </a:blip>
+          <a:stretch>
+            <a:fillRect/>
+          </a:stretch>
+        </p:blipFill>
+        <p:spPr>
+          <a:xfrm>
+            <a:off x="8477807" y="3423662"/>
+            <a:ext cx="335537" cy="335537"/>
+          </a:xfrm>
+          <a:prstGeom prst="rect">
+            <a:avLst/>
+          </a:prstGeom>
+        </p:spPr>
+      </p:pic>
+      <p:pic>
+        <p:nvPicPr>
+          <p:cNvPr id="26" name="Gráfico 25" descr="Contrato">
+            <a:extLst>
+              <a:ext uri="{FF2B5EF4-FFF2-40B4-BE49-F238E27FC236}">
+                <a16:creationId xmlns:a16="http://schemas.microsoft.com/office/drawing/2014/main" id="{ABE57B93-6851-4504-8D2E-C15725A7F5E9}"/>
+              </a:ext>
+            </a:extLst>
+          </p:cNvPr>
+          <p:cNvPicPr>
+            <a:picLocks noChangeAspect="1"/>
+          </p:cNvPicPr>
+          <p:nvPr/>
+        </p:nvPicPr>
+        <p:blipFill>
+          <a:blip r:embed="rId6">
+            <a:extLst>
+              <a:ext uri="{28A0092B-C50C-407E-A947-70E740481C1C}">
+                <a14:useLocalDpi xmlns:a14="http://schemas.microsoft.com/office/drawing/2010/main" val="0"/>
+              </a:ext>
+              <a:ext uri="{96DAC541-7B7A-43D3-8B79-37D633B846F1}">
+                <asvg:svgBlip xmlns:asvg="http://schemas.microsoft.com/office/drawing/2016/SVG/main" r:embed="rId7"/>
+              </a:ext>
+            </a:extLst>
+          </a:blip>
+          <a:stretch>
+            <a:fillRect/>
+          </a:stretch>
+        </p:blipFill>
+        <p:spPr>
+          <a:xfrm>
+            <a:off x="8477807" y="3938065"/>
+            <a:ext cx="335537" cy="335537"/>
+          </a:xfrm>
+          <a:prstGeom prst="rect">
+            <a:avLst/>
+          </a:prstGeom>
+        </p:spPr>
+      </p:pic>
+      <p:sp>
+        <p:nvSpPr>
+          <p:cNvPr id="19" name="Elipse 18">
+            <a:extLst>
+              <a:ext uri="{FF2B5EF4-FFF2-40B4-BE49-F238E27FC236}">
+                <a16:creationId xmlns:a16="http://schemas.microsoft.com/office/drawing/2014/main" id="{979BBBB8-725E-45B7-AF6F-97D1A9E9394F}"/>
+              </a:ext>
+            </a:extLst>
+          </p:cNvPr>
+          <p:cNvSpPr/>
+          <p:nvPr/>
+        </p:nvSpPr>
+        <p:spPr>
+          <a:xfrm>
+            <a:off x="455493" y="2512549"/>
+            <a:ext cx="96051" cy="100149"/>
+          </a:xfrm>
+          <a:prstGeom prst="ellipse">
+            <a:avLst/>
+          </a:prstGeom>
+          <a:noFill/>
+          <a:ln w="38100">
+            <a:solidFill>
+              <a:srgbClr val="19FF3F"/>
+            </a:solidFill>
+          </a:ln>
+        </p:spPr>
+        <p:style>
+          <a:lnRef idx="2">
+            <a:schemeClr val="accent1">
+              <a:shade val="50000"/>
+            </a:schemeClr>
+          </a:lnRef>
+          <a:fillRef idx="1">
+            <a:schemeClr val="accent1"/>
+          </a:fillRef>
+          <a:effectRef idx="0">
+            <a:schemeClr val="accent1"/>
+          </a:effectRef>
+          <a:fontRef idx="minor">
+            <a:schemeClr val="lt1"/>
+          </a:fontRef>
+        </p:style>
+        <p:txBody>
+          <a:bodyPr rtlCol="0" anchor="ctr"/>
+          <a:lstStyle/>
+          <a:p>
+            <a:pPr algn="ctr"/>
+            <a:endParaRPr lang="es-CO"/>
+          </a:p>
+        </p:txBody>
+      </p:sp>
+      <p:sp>
+        <p:nvSpPr>
+          <p:cNvPr id="20" name="Elipse 19">
+            <a:extLst>
+              <a:ext uri="{FF2B5EF4-FFF2-40B4-BE49-F238E27FC236}">
+                <a16:creationId xmlns:a16="http://schemas.microsoft.com/office/drawing/2014/main" id="{4F84D47E-F481-477E-93C0-0956C7E12992}"/>
+              </a:ext>
+            </a:extLst>
+          </p:cNvPr>
+          <p:cNvSpPr/>
+          <p:nvPr/>
+        </p:nvSpPr>
+        <p:spPr>
+          <a:xfrm>
+            <a:off x="455493" y="3031672"/>
+            <a:ext cx="96051" cy="100149"/>
+          </a:xfrm>
+          <a:prstGeom prst="ellipse">
+            <a:avLst/>
+          </a:prstGeom>
+          <a:noFill/>
+          <a:ln w="38100">
+            <a:solidFill>
+              <a:srgbClr val="19FF3F"/>
+            </a:solidFill>
+          </a:ln>
+        </p:spPr>
+        <p:style>
+          <a:lnRef idx="2">
+            <a:schemeClr val="accent1">
+              <a:shade val="50000"/>
+            </a:schemeClr>
+          </a:lnRef>
+          <a:fillRef idx="1">
+            <a:schemeClr val="accent1"/>
+          </a:fillRef>
+          <a:effectRef idx="0">
+            <a:schemeClr val="accent1"/>
+          </a:effectRef>
+          <a:fontRef idx="minor">
+            <a:schemeClr val="lt1"/>
+          </a:fontRef>
+        </p:style>
+        <p:txBody>
+          <a:bodyPr rtlCol="0" anchor="ctr"/>
+          <a:lstStyle/>
+          <a:p>
+            <a:pPr algn="ctr"/>
+            <a:endParaRPr lang="es-CO"/>
+          </a:p>
+        </p:txBody>
+      </p:sp>
+      <p:sp>
+        <p:nvSpPr>
+          <p:cNvPr id="21" name="Elipse 20">
+            <a:extLst>
+              <a:ext uri="{FF2B5EF4-FFF2-40B4-BE49-F238E27FC236}">
+                <a16:creationId xmlns:a16="http://schemas.microsoft.com/office/drawing/2014/main" id="{2D914BEE-5C34-42E8-8BF0-3BE0500960E2}"/>
+              </a:ext>
+            </a:extLst>
+          </p:cNvPr>
+          <p:cNvSpPr/>
+          <p:nvPr/>
+        </p:nvSpPr>
+        <p:spPr>
+          <a:xfrm>
+            <a:off x="462748" y="3541355"/>
+            <a:ext cx="96051" cy="100149"/>
+          </a:xfrm>
+          <a:prstGeom prst="ellipse">
+            <a:avLst/>
+          </a:prstGeom>
+          <a:noFill/>
+          <a:ln w="38100">
+            <a:solidFill>
+              <a:srgbClr val="19FF3F"/>
+            </a:solidFill>
+          </a:ln>
+        </p:spPr>
+        <p:style>
+          <a:lnRef idx="2">
+            <a:schemeClr val="accent1">
+              <a:shade val="50000"/>
+            </a:schemeClr>
+          </a:lnRef>
+          <a:fillRef idx="1">
+            <a:schemeClr val="accent1"/>
+          </a:fillRef>
+          <a:effectRef idx="0">
+            <a:schemeClr val="accent1"/>
+          </a:effectRef>
+          <a:fontRef idx="minor">
+            <a:schemeClr val="lt1"/>
+          </a:fontRef>
+        </p:style>
+        <p:txBody>
+          <a:bodyPr rtlCol="0" anchor="ctr"/>
+          <a:lstStyle/>
+          <a:p>
+            <a:pPr algn="ctr"/>
+            <a:endParaRPr lang="es-CO"/>
+          </a:p>
+        </p:txBody>
+      </p:sp>
+      <p:sp>
+        <p:nvSpPr>
+          <p:cNvPr id="27" name="Elipse 26">
+            <a:extLst>
+              <a:ext uri="{FF2B5EF4-FFF2-40B4-BE49-F238E27FC236}">
+                <a16:creationId xmlns:a16="http://schemas.microsoft.com/office/drawing/2014/main" id="{6D84E320-D333-4A3C-87B5-B4B8F06551FF}"/>
+              </a:ext>
+            </a:extLst>
+          </p:cNvPr>
+          <p:cNvSpPr/>
+          <p:nvPr/>
+        </p:nvSpPr>
+        <p:spPr>
+          <a:xfrm>
+            <a:off x="462748" y="4055758"/>
+            <a:ext cx="96051" cy="100149"/>
+          </a:xfrm>
+          <a:prstGeom prst="ellipse">
+            <a:avLst/>
+          </a:prstGeom>
+          <a:noFill/>
+          <a:ln w="38100">
+            <a:solidFill>
+              <a:srgbClr val="19FF3F"/>
+            </a:solidFill>
+          </a:ln>
+        </p:spPr>
+        <p:style>
+          <a:lnRef idx="2">
+            <a:schemeClr val="accent1">
+              <a:shade val="50000"/>
+            </a:schemeClr>
+          </a:lnRef>
+          <a:fillRef idx="1">
+            <a:schemeClr val="accent1"/>
+          </a:fillRef>
+          <a:effectRef idx="0">
+            <a:schemeClr val="accent1"/>
+          </a:effectRef>
+          <a:fontRef idx="minor">
+            <a:schemeClr val="lt1"/>
+          </a:fontRef>
+        </p:style>
+        <p:txBody>
+          <a:bodyPr rtlCol="0" anchor="ctr"/>
+          <a:lstStyle/>
+          <a:p>
+            <a:pPr algn="ctr"/>
+            <a:endParaRPr lang="es-CO"/>
+          </a:p>
+        </p:txBody>
+      </p:sp>
+      <p:sp>
+        <p:nvSpPr>
+          <p:cNvPr id="28" name="Rectángulo 27">
+            <a:extLst>
+              <a:ext uri="{FF2B5EF4-FFF2-40B4-BE49-F238E27FC236}">
+                <a16:creationId xmlns:a16="http://schemas.microsoft.com/office/drawing/2014/main" id="{1B68163E-4C3C-4CD3-838F-9CB9D2723553}"/>
+              </a:ext>
+            </a:extLst>
+          </p:cNvPr>
+          <p:cNvSpPr/>
+          <p:nvPr/>
+        </p:nvSpPr>
+        <p:spPr>
+          <a:xfrm>
+            <a:off x="878111" y="1807027"/>
+            <a:ext cx="566059" cy="508000"/>
           </a:xfrm>
           <a:prstGeom prst="rect">
             <a:avLst/>
@@ -4539,19 +4955,22 @@
           <a:p>
             <a:r>
               <a:rPr lang="es-CO" dirty="0">
+                <a:solidFill>
+                  <a:srgbClr val="085173"/>
+                </a:solidFill>
                 <a:latin typeface="Raleway" panose="020B0503030101060003" pitchFamily="34" charset="0"/>
               </a:rPr>
-              <a:t>Abiertos</a:t>
-            </a:r>
-          </a:p>
-        </p:txBody>
-      </p:sp>
-      <p:sp>
-        <p:nvSpPr>
-          <p:cNvPr id="2" name="Signo menos 1">
+              <a:t>id</a:t>
+            </a:r>
+          </a:p>
+        </p:txBody>
+      </p:sp>
+      <p:sp>
+        <p:nvSpPr>
+          <p:cNvPr id="29" name="Rectángulo 28">
             <a:extLst>
               <a:ext uri="{FF2B5EF4-FFF2-40B4-BE49-F238E27FC236}">
-                <a16:creationId xmlns:a16="http://schemas.microsoft.com/office/drawing/2014/main" id="{75AA531D-ADD4-4683-B42A-EFF54C6F20FF}"/>
+                <a16:creationId xmlns:a16="http://schemas.microsoft.com/office/drawing/2014/main" id="{2FD864BA-ED32-4891-9D0F-69B866BE147E}"/>
               </a:ext>
             </a:extLst>
           </p:cNvPr>
@@ -4560,17 +4979,19 @@
         </p:nvSpPr>
         <p:spPr>
           <a:xfrm>
-            <a:off x="8275465" y="1454202"/>
-            <a:ext cx="309735" cy="197651"/>
-          </a:xfrm>
-          <a:prstGeom prst="mathMinus">
+            <a:off x="885366" y="2315028"/>
+            <a:ext cx="566059" cy="508000"/>
+          </a:xfrm>
+          <a:prstGeom prst="rect">
             <a:avLst/>
           </a:prstGeom>
-          <a:solidFill>
-            <a:schemeClr val="bg1"/>
-          </a:solidFill>
+          <a:noFill/>
           <a:ln>
-            <a:noFill/>
+            <a:solidFill>
+              <a:schemeClr val="accent1">
+                <a:shade val="50000"/>
+              </a:schemeClr>
+            </a:solidFill>
           </a:ln>
         </p:spPr>
         <p:style>
@@ -4593,206 +5014,448 @@
           <a:bodyPr rtlCol="0" anchor="ctr"/>
           <a:lstStyle/>
           <a:p>
-            <a:pPr algn="ctr"/>
-            <a:endParaRPr lang="es-CO"/>
-          </a:p>
-        </p:txBody>
-      </p:sp>
-      <p:pic>
-        <p:nvPicPr>
-          <p:cNvPr id="5" name="Gráfico 4" descr="Contrato">
+            <a:endParaRPr lang="es-CO" dirty="0">
+              <a:solidFill>
+                <a:srgbClr val="085173"/>
+              </a:solidFill>
+              <a:latin typeface="Raleway" panose="020B0503030101060003" pitchFamily="34" charset="0"/>
+            </a:endParaRPr>
+          </a:p>
+        </p:txBody>
+      </p:sp>
+      <p:sp>
+        <p:nvSpPr>
+          <p:cNvPr id="30" name="Rectángulo 29">
             <a:extLst>
               <a:ext uri="{FF2B5EF4-FFF2-40B4-BE49-F238E27FC236}">
-                <a16:creationId xmlns:a16="http://schemas.microsoft.com/office/drawing/2014/main" id="{404BB68F-4603-4CBF-AC85-E5E904D660E4}"/>
+                <a16:creationId xmlns:a16="http://schemas.microsoft.com/office/drawing/2014/main" id="{D2CF323A-4DE4-446C-B747-8B4FB8972186}"/>
               </a:ext>
             </a:extLst>
           </p:cNvPr>
-          <p:cNvPicPr>
-            <a:picLocks noChangeAspect="1"/>
-          </p:cNvPicPr>
+          <p:cNvSpPr/>
           <p:nvPr/>
-        </p:nvPicPr>
-        <p:blipFill>
-          <a:blip r:embed="rId6">
-            <a:extLst>
-              <a:ext uri="{28A0092B-C50C-407E-A947-70E740481C1C}">
-                <a14:useLocalDpi xmlns:a14="http://schemas.microsoft.com/office/drawing/2010/main" val="0"/>
-              </a:ext>
-              <a:ext uri="{96DAC541-7B7A-43D3-8B79-37D633B846F1}">
-                <asvg:svgBlip xmlns:asvg="http://schemas.microsoft.com/office/drawing/2016/SVG/main" r:embed="rId7"/>
-              </a:ext>
-            </a:extLst>
-          </a:blip>
-          <a:stretch>
-            <a:fillRect/>
-          </a:stretch>
-        </p:blipFill>
-        <p:spPr>
-          <a:xfrm>
-            <a:off x="8477807" y="1898704"/>
-            <a:ext cx="335537" cy="335537"/>
+        </p:nvSpPr>
+        <p:spPr>
+          <a:xfrm>
+            <a:off x="885367" y="2823028"/>
+            <a:ext cx="566059" cy="508000"/>
           </a:xfrm>
           <a:prstGeom prst="rect">
             <a:avLst/>
           </a:prstGeom>
-        </p:spPr>
-      </p:pic>
-      <p:pic>
-        <p:nvPicPr>
-          <p:cNvPr id="23" name="Gráfico 22" descr="Contrato">
+          <a:noFill/>
+          <a:ln>
+            <a:solidFill>
+              <a:schemeClr val="accent1">
+                <a:shade val="50000"/>
+              </a:schemeClr>
+            </a:solidFill>
+          </a:ln>
+        </p:spPr>
+        <p:style>
+          <a:lnRef idx="2">
+            <a:schemeClr val="accent1">
+              <a:shade val="50000"/>
+            </a:schemeClr>
+          </a:lnRef>
+          <a:fillRef idx="1">
+            <a:schemeClr val="accent1"/>
+          </a:fillRef>
+          <a:effectRef idx="0">
+            <a:schemeClr val="accent1"/>
+          </a:effectRef>
+          <a:fontRef idx="minor">
+            <a:schemeClr val="lt1"/>
+          </a:fontRef>
+        </p:style>
+        <p:txBody>
+          <a:bodyPr rtlCol="0" anchor="ctr"/>
+          <a:lstStyle/>
+          <a:p>
+            <a:endParaRPr lang="es-CO" dirty="0">
+              <a:latin typeface="Raleway" panose="020B0503030101060003" pitchFamily="34" charset="0"/>
+            </a:endParaRPr>
+          </a:p>
+        </p:txBody>
+      </p:sp>
+      <p:sp>
+        <p:nvSpPr>
+          <p:cNvPr id="31" name="Rectángulo 30">
             <a:extLst>
               <a:ext uri="{FF2B5EF4-FFF2-40B4-BE49-F238E27FC236}">
-                <a16:creationId xmlns:a16="http://schemas.microsoft.com/office/drawing/2014/main" id="{C3690510-13DE-404D-B136-635019266933}"/>
+                <a16:creationId xmlns:a16="http://schemas.microsoft.com/office/drawing/2014/main" id="{845F6891-FB56-4469-BEA5-59F0E4C90E7A}"/>
               </a:ext>
             </a:extLst>
           </p:cNvPr>
-          <p:cNvPicPr>
-            <a:picLocks noChangeAspect="1"/>
-          </p:cNvPicPr>
+          <p:cNvSpPr/>
           <p:nvPr/>
-        </p:nvPicPr>
-        <p:blipFill>
-          <a:blip r:embed="rId6">
-            <a:extLst>
-              <a:ext uri="{28A0092B-C50C-407E-A947-70E740481C1C}">
-                <a14:useLocalDpi xmlns:a14="http://schemas.microsoft.com/office/drawing/2010/main" val="0"/>
-              </a:ext>
-              <a:ext uri="{96DAC541-7B7A-43D3-8B79-37D633B846F1}">
-                <asvg:svgBlip xmlns:asvg="http://schemas.microsoft.com/office/drawing/2016/SVG/main" r:embed="rId7"/>
-              </a:ext>
-            </a:extLst>
-          </a:blip>
-          <a:stretch>
-            <a:fillRect/>
-          </a:stretch>
-        </p:blipFill>
-        <p:spPr>
-          <a:xfrm>
-            <a:off x="8477809" y="2394856"/>
-            <a:ext cx="335537" cy="335537"/>
+        </p:nvSpPr>
+        <p:spPr>
+          <a:xfrm>
+            <a:off x="885366" y="3331028"/>
+            <a:ext cx="566059" cy="508000"/>
           </a:xfrm>
           <a:prstGeom prst="rect">
             <a:avLst/>
           </a:prstGeom>
-        </p:spPr>
-      </p:pic>
-      <p:pic>
-        <p:nvPicPr>
-          <p:cNvPr id="24" name="Gráfico 23" descr="Contrato">
+          <a:noFill/>
+          <a:ln>
+            <a:solidFill>
+              <a:schemeClr val="accent1">
+                <a:shade val="50000"/>
+              </a:schemeClr>
+            </a:solidFill>
+          </a:ln>
+        </p:spPr>
+        <p:style>
+          <a:lnRef idx="2">
+            <a:schemeClr val="accent1">
+              <a:shade val="50000"/>
+            </a:schemeClr>
+          </a:lnRef>
+          <a:fillRef idx="1">
+            <a:schemeClr val="accent1"/>
+          </a:fillRef>
+          <a:effectRef idx="0">
+            <a:schemeClr val="accent1"/>
+          </a:effectRef>
+          <a:fontRef idx="minor">
+            <a:schemeClr val="lt1"/>
+          </a:fontRef>
+        </p:style>
+        <p:txBody>
+          <a:bodyPr rtlCol="0" anchor="ctr"/>
+          <a:lstStyle/>
+          <a:p>
+            <a:endParaRPr lang="es-CO" dirty="0">
+              <a:latin typeface="Raleway" panose="020B0503030101060003" pitchFamily="34" charset="0"/>
+            </a:endParaRPr>
+          </a:p>
+        </p:txBody>
+      </p:sp>
+      <p:sp>
+        <p:nvSpPr>
+          <p:cNvPr id="32" name="Rectángulo 31">
             <a:extLst>
               <a:ext uri="{FF2B5EF4-FFF2-40B4-BE49-F238E27FC236}">
-                <a16:creationId xmlns:a16="http://schemas.microsoft.com/office/drawing/2014/main" id="{3A538ADD-E2D0-419E-B523-56AF75910829}"/>
+                <a16:creationId xmlns:a16="http://schemas.microsoft.com/office/drawing/2014/main" id="{B6D79676-6AD4-4FA7-958C-B906670A5B34}"/>
               </a:ext>
             </a:extLst>
           </p:cNvPr>
-          <p:cNvPicPr>
-            <a:picLocks noChangeAspect="1"/>
-          </p:cNvPicPr>
+          <p:cNvSpPr/>
           <p:nvPr/>
-        </p:nvPicPr>
-        <p:blipFill>
-          <a:blip r:embed="rId6">
-            <a:extLst>
-              <a:ext uri="{28A0092B-C50C-407E-A947-70E740481C1C}">
-                <a14:useLocalDpi xmlns:a14="http://schemas.microsoft.com/office/drawing/2010/main" val="0"/>
-              </a:ext>
-              <a:ext uri="{96DAC541-7B7A-43D3-8B79-37D633B846F1}">
-                <asvg:svgBlip xmlns:asvg="http://schemas.microsoft.com/office/drawing/2016/SVG/main" r:embed="rId7"/>
-              </a:ext>
-            </a:extLst>
-          </a:blip>
-          <a:stretch>
-            <a:fillRect/>
-          </a:stretch>
-        </p:blipFill>
-        <p:spPr>
-          <a:xfrm>
-            <a:off x="8477808" y="2909259"/>
-            <a:ext cx="335537" cy="335537"/>
+        </p:nvSpPr>
+        <p:spPr>
+          <a:xfrm>
+            <a:off x="885365" y="3839028"/>
+            <a:ext cx="566059" cy="508000"/>
           </a:xfrm>
           <a:prstGeom prst="rect">
             <a:avLst/>
           </a:prstGeom>
-        </p:spPr>
-      </p:pic>
-      <p:pic>
-        <p:nvPicPr>
-          <p:cNvPr id="25" name="Gráfico 24" descr="Contrato">
+          <a:noFill/>
+          <a:ln>
+            <a:solidFill>
+              <a:schemeClr val="accent1">
+                <a:shade val="50000"/>
+              </a:schemeClr>
+            </a:solidFill>
+          </a:ln>
+        </p:spPr>
+        <p:style>
+          <a:lnRef idx="2">
+            <a:schemeClr val="accent1">
+              <a:shade val="50000"/>
+            </a:schemeClr>
+          </a:lnRef>
+          <a:fillRef idx="1">
+            <a:schemeClr val="accent1"/>
+          </a:fillRef>
+          <a:effectRef idx="0">
+            <a:schemeClr val="accent1"/>
+          </a:effectRef>
+          <a:fontRef idx="minor">
+            <a:schemeClr val="lt1"/>
+          </a:fontRef>
+        </p:style>
+        <p:txBody>
+          <a:bodyPr rtlCol="0" anchor="ctr"/>
+          <a:lstStyle/>
+          <a:p>
+            <a:endParaRPr lang="es-CO" dirty="0">
+              <a:latin typeface="Raleway" panose="020B0503030101060003" pitchFamily="34" charset="0"/>
+            </a:endParaRPr>
+          </a:p>
+        </p:txBody>
+      </p:sp>
+      <p:sp>
+        <p:nvSpPr>
+          <p:cNvPr id="33" name="Rectángulo 32">
             <a:extLst>
               <a:ext uri="{FF2B5EF4-FFF2-40B4-BE49-F238E27FC236}">
-                <a16:creationId xmlns:a16="http://schemas.microsoft.com/office/drawing/2014/main" id="{4F77D987-094F-433E-8A76-93CB2C8C0107}"/>
+                <a16:creationId xmlns:a16="http://schemas.microsoft.com/office/drawing/2014/main" id="{080D4863-0663-4057-B838-0EFD99D0AD1D}"/>
               </a:ext>
             </a:extLst>
           </p:cNvPr>
-          <p:cNvPicPr>
-            <a:picLocks noChangeAspect="1"/>
-          </p:cNvPicPr>
+          <p:cNvSpPr/>
           <p:nvPr/>
-        </p:nvPicPr>
-        <p:blipFill>
-          <a:blip r:embed="rId6">
-            <a:extLst>
-              <a:ext uri="{28A0092B-C50C-407E-A947-70E740481C1C}">
-                <a14:useLocalDpi xmlns:a14="http://schemas.microsoft.com/office/drawing/2010/main" val="0"/>
-              </a:ext>
-              <a:ext uri="{96DAC541-7B7A-43D3-8B79-37D633B846F1}">
-                <asvg:svgBlip xmlns:asvg="http://schemas.microsoft.com/office/drawing/2016/SVG/main" r:embed="rId7"/>
-              </a:ext>
-            </a:extLst>
-          </a:blip>
-          <a:stretch>
-            <a:fillRect/>
-          </a:stretch>
-        </p:blipFill>
-        <p:spPr>
-          <a:xfrm>
-            <a:off x="8477807" y="3423662"/>
-            <a:ext cx="335537" cy="335537"/>
+        </p:nvSpPr>
+        <p:spPr>
+          <a:xfrm>
+            <a:off x="1451424" y="1807027"/>
+            <a:ext cx="566059" cy="508000"/>
           </a:xfrm>
           <a:prstGeom prst="rect">
             <a:avLst/>
           </a:prstGeom>
-        </p:spPr>
-      </p:pic>
-      <p:pic>
-        <p:nvPicPr>
-          <p:cNvPr id="26" name="Gráfico 25" descr="Contrato">
+          <a:noFill/>
+          <a:ln>
+            <a:solidFill>
+              <a:schemeClr val="accent1">
+                <a:shade val="50000"/>
+              </a:schemeClr>
+            </a:solidFill>
+          </a:ln>
+        </p:spPr>
+        <p:style>
+          <a:lnRef idx="2">
+            <a:schemeClr val="accent1">
+              <a:shade val="50000"/>
+            </a:schemeClr>
+          </a:lnRef>
+          <a:fillRef idx="1">
+            <a:schemeClr val="accent1"/>
+          </a:fillRef>
+          <a:effectRef idx="0">
+            <a:schemeClr val="accent1"/>
+          </a:effectRef>
+          <a:fontRef idx="minor">
+            <a:schemeClr val="lt1"/>
+          </a:fontRef>
+        </p:style>
+        <p:txBody>
+          <a:bodyPr rtlCol="0" anchor="ctr"/>
+          <a:lstStyle/>
+          <a:p>
+            <a:r>
+              <a:rPr lang="es-CO" sz="1100" dirty="0">
+                <a:solidFill>
+                  <a:srgbClr val="085173"/>
+                </a:solidFill>
+                <a:latin typeface="Raleway" panose="020B0503030101060003" pitchFamily="34" charset="0"/>
+              </a:rPr>
+              <a:t>fecha</a:t>
+            </a:r>
+            <a:endParaRPr lang="es-CO" dirty="0">
+              <a:solidFill>
+                <a:srgbClr val="085173"/>
+              </a:solidFill>
+              <a:latin typeface="Raleway" panose="020B0503030101060003" pitchFamily="34" charset="0"/>
+            </a:endParaRPr>
+          </a:p>
+        </p:txBody>
+      </p:sp>
+      <p:sp>
+        <p:nvSpPr>
+          <p:cNvPr id="34" name="Rectángulo 33">
             <a:extLst>
               <a:ext uri="{FF2B5EF4-FFF2-40B4-BE49-F238E27FC236}">
-                <a16:creationId xmlns:a16="http://schemas.microsoft.com/office/drawing/2014/main" id="{ABE57B93-6851-4504-8D2E-C15725A7F5E9}"/>
+                <a16:creationId xmlns:a16="http://schemas.microsoft.com/office/drawing/2014/main" id="{82D17144-36EB-4FD2-9CA6-163AE948B123}"/>
               </a:ext>
             </a:extLst>
           </p:cNvPr>
-          <p:cNvPicPr>
-            <a:picLocks noChangeAspect="1"/>
-          </p:cNvPicPr>
+          <p:cNvSpPr/>
           <p:nvPr/>
-        </p:nvPicPr>
-        <p:blipFill>
-          <a:blip r:embed="rId6">
-            <a:extLst>
-              <a:ext uri="{28A0092B-C50C-407E-A947-70E740481C1C}">
-                <a14:useLocalDpi xmlns:a14="http://schemas.microsoft.com/office/drawing/2010/main" val="0"/>
-              </a:ext>
-              <a:ext uri="{96DAC541-7B7A-43D3-8B79-37D633B846F1}">
-                <asvg:svgBlip xmlns:asvg="http://schemas.microsoft.com/office/drawing/2016/SVG/main" r:embed="rId7"/>
-              </a:ext>
-            </a:extLst>
-          </a:blip>
-          <a:stretch>
-            <a:fillRect/>
-          </a:stretch>
-        </p:blipFill>
-        <p:spPr>
-          <a:xfrm>
-            <a:off x="8477807" y="3938065"/>
-            <a:ext cx="335537" cy="335537"/>
+        </p:nvSpPr>
+        <p:spPr>
+          <a:xfrm>
+            <a:off x="2017481" y="1807027"/>
+            <a:ext cx="3207662" cy="508000"/>
           </a:xfrm>
           <a:prstGeom prst="rect">
             <a:avLst/>
           </a:prstGeom>
-        </p:spPr>
-      </p:pic>
+          <a:noFill/>
+          <a:ln>
+            <a:solidFill>
+              <a:schemeClr val="accent1">
+                <a:shade val="50000"/>
+              </a:schemeClr>
+            </a:solidFill>
+          </a:ln>
+        </p:spPr>
+        <p:style>
+          <a:lnRef idx="2">
+            <a:schemeClr val="accent1">
+              <a:shade val="50000"/>
+            </a:schemeClr>
+          </a:lnRef>
+          <a:fillRef idx="1">
+            <a:schemeClr val="accent1"/>
+          </a:fillRef>
+          <a:effectRef idx="0">
+            <a:schemeClr val="accent1"/>
+          </a:effectRef>
+          <a:fontRef idx="minor">
+            <a:schemeClr val="lt1"/>
+          </a:fontRef>
+        </p:style>
+        <p:txBody>
+          <a:bodyPr rtlCol="0" anchor="ctr"/>
+          <a:lstStyle/>
+          <a:p>
+            <a:r>
+              <a:rPr lang="es-CO" sz="1100" dirty="0">
+                <a:solidFill>
+                  <a:srgbClr val="085173"/>
+                </a:solidFill>
+                <a:latin typeface="Raleway" panose="020B0503030101060003" pitchFamily="34" charset="0"/>
+              </a:rPr>
+              <a:t>título</a:t>
+            </a:r>
+            <a:endParaRPr lang="es-CO" dirty="0">
+              <a:solidFill>
+                <a:srgbClr val="085173"/>
+              </a:solidFill>
+              <a:latin typeface="Raleway" panose="020B0503030101060003" pitchFamily="34" charset="0"/>
+            </a:endParaRPr>
+          </a:p>
+        </p:txBody>
+      </p:sp>
+      <p:sp>
+        <p:nvSpPr>
+          <p:cNvPr id="35" name="Rectángulo 34">
+            <a:extLst>
+              <a:ext uri="{FF2B5EF4-FFF2-40B4-BE49-F238E27FC236}">
+                <a16:creationId xmlns:a16="http://schemas.microsoft.com/office/drawing/2014/main" id="{B98FBBC1-4F78-48D1-8203-AF6199733AB4}"/>
+              </a:ext>
+            </a:extLst>
+          </p:cNvPr>
+          <p:cNvSpPr/>
+          <p:nvPr/>
+        </p:nvSpPr>
+        <p:spPr>
+          <a:xfrm>
+            <a:off x="5225143" y="1807027"/>
+            <a:ext cx="1981193" cy="508000"/>
+          </a:xfrm>
+          <a:prstGeom prst="rect">
+            <a:avLst/>
+          </a:prstGeom>
+          <a:noFill/>
+          <a:ln>
+            <a:solidFill>
+              <a:schemeClr val="accent1">
+                <a:shade val="50000"/>
+              </a:schemeClr>
+            </a:solidFill>
+          </a:ln>
+        </p:spPr>
+        <p:style>
+          <a:lnRef idx="2">
+            <a:schemeClr val="accent1">
+              <a:shade val="50000"/>
+            </a:schemeClr>
+          </a:lnRef>
+          <a:fillRef idx="1">
+            <a:schemeClr val="accent1"/>
+          </a:fillRef>
+          <a:effectRef idx="0">
+            <a:schemeClr val="accent1"/>
+          </a:effectRef>
+          <a:fontRef idx="minor">
+            <a:schemeClr val="lt1"/>
+          </a:fontRef>
+        </p:style>
+        <p:txBody>
+          <a:bodyPr rtlCol="0" anchor="ctr"/>
+          <a:lstStyle/>
+          <a:p>
+            <a:r>
+              <a:rPr lang="es-CO" sz="1100" dirty="0">
+                <a:solidFill>
+                  <a:srgbClr val="085173"/>
+                </a:solidFill>
+                <a:latin typeface="Raleway" panose="020B0503030101060003" pitchFamily="34" charset="0"/>
+              </a:rPr>
+              <a:t>empresa</a:t>
+            </a:r>
+            <a:endParaRPr lang="es-CO" dirty="0">
+              <a:solidFill>
+                <a:srgbClr val="085173"/>
+              </a:solidFill>
+              <a:latin typeface="Raleway" panose="020B0503030101060003" pitchFamily="34" charset="0"/>
+            </a:endParaRPr>
+          </a:p>
+        </p:txBody>
+      </p:sp>
+      <p:sp>
+        <p:nvSpPr>
+          <p:cNvPr id="36" name="Rectángulo 35">
+            <a:extLst>
+              <a:ext uri="{FF2B5EF4-FFF2-40B4-BE49-F238E27FC236}">
+                <a16:creationId xmlns:a16="http://schemas.microsoft.com/office/drawing/2014/main" id="{5001AB00-0A7C-4BBA-91AB-75CA19D1C909}"/>
+              </a:ext>
+            </a:extLst>
+          </p:cNvPr>
+          <p:cNvSpPr/>
+          <p:nvPr/>
+        </p:nvSpPr>
+        <p:spPr>
+          <a:xfrm>
+            <a:off x="7206338" y="1807027"/>
+            <a:ext cx="1218331" cy="508000"/>
+          </a:xfrm>
+          <a:prstGeom prst="rect">
+            <a:avLst/>
+          </a:prstGeom>
+          <a:noFill/>
+          <a:ln>
+            <a:solidFill>
+              <a:schemeClr val="accent1">
+                <a:shade val="50000"/>
+              </a:schemeClr>
+            </a:solidFill>
+          </a:ln>
+        </p:spPr>
+        <p:style>
+          <a:lnRef idx="2">
+            <a:schemeClr val="accent1">
+              <a:shade val="50000"/>
+            </a:schemeClr>
+          </a:lnRef>
+          <a:fillRef idx="1">
+            <a:schemeClr val="accent1"/>
+          </a:fillRef>
+          <a:effectRef idx="0">
+            <a:schemeClr val="accent1"/>
+          </a:effectRef>
+          <a:fontRef idx="minor">
+            <a:schemeClr val="lt1"/>
+          </a:fontRef>
+        </p:style>
+        <p:txBody>
+          <a:bodyPr rtlCol="0" anchor="ctr"/>
+          <a:lstStyle/>
+          <a:p>
+            <a:r>
+              <a:rPr lang="es-CO" sz="1100">
+                <a:solidFill>
+                  <a:srgbClr val="085173"/>
+                </a:solidFill>
+                <a:latin typeface="Raleway" panose="020B0503030101060003" pitchFamily="34" charset="0"/>
+              </a:rPr>
+              <a:t>categoría</a:t>
+            </a:r>
+            <a:endParaRPr lang="es-CO" dirty="0">
+              <a:solidFill>
+                <a:srgbClr val="085173"/>
+              </a:solidFill>
+              <a:latin typeface="Raleway" panose="020B0503030101060003" pitchFamily="34" charset="0"/>
+            </a:endParaRPr>
+          </a:p>
+        </p:txBody>
+      </p:sp>
     </p:spTree>
     <p:extLst>
       <p:ext uri="{BB962C8B-B14F-4D97-AF65-F5344CB8AC3E}">

</xml_diff>